<commit_message>
Upload lecture 7 materials
</commit_message>
<xml_diff>
--- a/07/DATA515_07_ClassUpdates.pptx
+++ b/07/DATA515_07_ClassUpdates.pptx
@@ -13,10 +13,6 @@
     <p:sldId id="258" r:id="rId8"/>
     <p:sldId id="259" r:id="rId9"/>
     <p:sldId id="260" r:id="rId10"/>
-    <p:sldId id="261" r:id="rId11"/>
-    <p:sldId id="262" r:id="rId12"/>
-    <p:sldId id="263" r:id="rId13"/>
-    <p:sldId id="264" r:id="rId14"/>
   </p:sldIdLst>
   <p:sldSz cy="5143500" cx="9144000"/>
   <p:notesSz cx="6858000" cy="9144000"/>
@@ -812,7 +808,7 @@
       </p:grpSpPr>
       <p:sp>
         <p:nvSpPr>
-          <p:cNvPr id="66" name="Google Shape;66;g2b98cac9cd8_0_11:notes"/>
+          <p:cNvPr id="66" name="Google Shape;66;g2b98cac9cd8_0_0:notes"/>
           <p:cNvSpPr/>
           <p:nvPr>
             <p:ph idx="2" type="sldImg"/>
@@ -847,7 +843,7 @@
       </p:sp>
       <p:sp>
         <p:nvSpPr>
-          <p:cNvPr id="67" name="Google Shape;67;g2b98cac9cd8_0_11:notes"/>
+          <p:cNvPr id="67" name="Google Shape;67;g2b98cac9cd8_0_0:notes"/>
           <p:cNvSpPr txBox="1"/>
           <p:nvPr>
             <p:ph idx="1" type="body"/>
@@ -897,7 +893,7 @@
   <p:cSld>
     <p:spTree>
       <p:nvGrpSpPr>
-        <p:cNvPr id="72" name="Shape 72"/>
+        <p:cNvPr id="70" name="Shape 70"/>
         <p:cNvGrpSpPr/>
         <p:nvPr/>
       </p:nvGrpSpPr>
@@ -911,7 +907,7 @@
       </p:grpSpPr>
       <p:sp>
         <p:nvSpPr>
-          <p:cNvPr id="73" name="Google Shape;73;g2b98cac9cd8_0_0:notes"/>
+          <p:cNvPr id="71" name="Google Shape;71;g2b98cac9cd8_0_17:notes"/>
           <p:cNvSpPr/>
           <p:nvPr>
             <p:ph idx="2" type="sldImg"/>
@@ -946,7 +942,7 @@
       </p:sp>
       <p:sp>
         <p:nvSpPr>
-          <p:cNvPr id="74" name="Google Shape;74;g2b98cac9cd8_0_0:notes"/>
+          <p:cNvPr id="72" name="Google Shape;72;g2b98cac9cd8_0_17:notes"/>
           <p:cNvSpPr txBox="1"/>
           <p:nvPr>
             <p:ph idx="1" type="body"/>
@@ -996,7 +992,7 @@
   <p:cSld>
     <p:spTree>
       <p:nvGrpSpPr>
-        <p:cNvPr id="77" name="Shape 77"/>
+        <p:cNvPr id="76" name="Shape 76"/>
         <p:cNvGrpSpPr/>
         <p:nvPr/>
       </p:nvGrpSpPr>
@@ -1010,7 +1006,7 @@
       </p:grpSpPr>
       <p:sp>
         <p:nvSpPr>
-          <p:cNvPr id="78" name="Google Shape;78;g2b98cac9cd8_0_17:notes"/>
+          <p:cNvPr id="77" name="Google Shape;77;g2b98cac9cd8_0_27:notes"/>
           <p:cNvSpPr/>
           <p:nvPr>
             <p:ph idx="2" type="sldImg"/>
@@ -1045,7 +1041,7 @@
       </p:sp>
       <p:sp>
         <p:nvSpPr>
-          <p:cNvPr id="79" name="Google Shape;79;g2b98cac9cd8_0_17:notes"/>
+          <p:cNvPr id="78" name="Google Shape;78;g2b98cac9cd8_0_27:notes"/>
           <p:cNvSpPr txBox="1"/>
           <p:nvPr>
             <p:ph idx="1" type="body"/>
@@ -1095,7 +1091,7 @@
   <p:cSld>
     <p:spTree>
       <p:nvGrpSpPr>
-        <p:cNvPr id="83" name="Shape 83"/>
+        <p:cNvPr id="82" name="Shape 82"/>
         <p:cNvGrpSpPr/>
         <p:nvPr/>
       </p:nvGrpSpPr>
@@ -1109,7 +1105,7 @@
       </p:grpSpPr>
       <p:sp>
         <p:nvSpPr>
-          <p:cNvPr id="84" name="Google Shape;84;g2b98cac9cd8_0_22:notes"/>
+          <p:cNvPr id="83" name="Google Shape;83;g26902ce950f_0_0:notes"/>
           <p:cNvSpPr/>
           <p:nvPr>
             <p:ph idx="2" type="sldImg"/>
@@ -1144,403 +1140,7 @@
       </p:sp>
       <p:sp>
         <p:nvSpPr>
-          <p:cNvPr id="85" name="Google Shape;85;g2b98cac9cd8_0_22:notes"/>
-          <p:cNvSpPr txBox="1"/>
-          <p:nvPr>
-            <p:ph idx="1" type="body"/>
-          </p:nvPr>
-        </p:nvSpPr>
-        <p:spPr>
-          <a:xfrm>
-            <a:off x="685800" y="4343400"/>
-            <a:ext cx="5486400" cy="4114800"/>
-          </a:xfrm>
-          <a:prstGeom prst="rect">
-            <a:avLst/>
-          </a:prstGeom>
-        </p:spPr>
-        <p:txBody>
-          <a:bodyPr anchorCtr="0" anchor="t" bIns="91425" lIns="91425" spcFirstLastPara="1" rIns="91425" wrap="square" tIns="91425">
-            <a:noAutofit/>
-          </a:bodyPr>
-          <a:lstStyle/>
-          <a:p>
-            <a:pPr indent="0" lvl="0" marL="0" rtl="0" algn="l">
-              <a:spcBef>
-                <a:spcPts val="0"/>
-              </a:spcBef>
-              <a:spcAft>
-                <a:spcPts val="0"/>
-              </a:spcAft>
-              <a:buNone/>
-            </a:pPr>
-            <a:r>
-              <a:t/>
-            </a:r>
-            <a:endParaRPr/>
-          </a:p>
-        </p:txBody>
-      </p:sp>
-    </p:spTree>
-  </p:cSld>
-  <p:clrMapOvr>
-    <a:masterClrMapping/>
-  </p:clrMapOvr>
-</p:notes>
-</file>
-
-<file path=ppt/notesSlides/notesSlide6.xml><?xml version="1.0" encoding="utf-8"?>
-<p:notes xmlns:a="http://schemas.openxmlformats.org/drawingml/2006/main" xmlns:r="http://schemas.openxmlformats.org/officeDocument/2006/relationships" xmlns:mc="http://schemas.openxmlformats.org/markup-compatibility/2006" xmlns:mv="urn:schemas-microsoft-com:mac:vml" xmlns:p="http://schemas.openxmlformats.org/presentationml/2006/main" xmlns:c="http://schemas.openxmlformats.org/drawingml/2006/chart" xmlns:dgm="http://schemas.openxmlformats.org/drawingml/2006/diagram" xmlns:o="urn:schemas-microsoft-com:office:office" xmlns:v="urn:schemas-microsoft-com:vml" xmlns:pvml="urn:schemas-microsoft-com:office:powerpoint" xmlns:com="http://schemas.openxmlformats.org/drawingml/2006/compatibility" xmlns:p14="http://schemas.microsoft.com/office/powerpoint/2010/main" xmlns:p15="http://schemas.microsoft.com/office/powerpoint/2012/main" xmlns:ahyp="http://schemas.microsoft.com/office/drawing/2018/hyperlinkcolor" showMasterPhAnim="0" showMasterSp="0">
-  <p:cSld>
-    <p:spTree>
-      <p:nvGrpSpPr>
-        <p:cNvPr id="89" name="Shape 89"/>
-        <p:cNvGrpSpPr/>
-        <p:nvPr/>
-      </p:nvGrpSpPr>
-      <p:grpSpPr>
-        <a:xfrm>
-          <a:off x="0" y="0"/>
-          <a:ext cx="0" cy="0"/>
-          <a:chOff x="0" y="0"/>
-          <a:chExt cx="0" cy="0"/>
-        </a:xfrm>
-      </p:grpSpPr>
-      <p:sp>
-        <p:nvSpPr>
-          <p:cNvPr id="90" name="Google Shape;90;g2b98cac9cd8_0_27:notes"/>
-          <p:cNvSpPr/>
-          <p:nvPr>
-            <p:ph idx="2" type="sldImg"/>
-          </p:nvPr>
-        </p:nvSpPr>
-        <p:spPr>
-          <a:xfrm>
-            <a:off x="381300" y="685800"/>
-            <a:ext cx="6096000" cy="3429000"/>
-          </a:xfrm>
-          <a:custGeom>
-            <a:rect b="b" l="l" r="r" t="t"/>
-            <a:pathLst>
-              <a:path extrusionOk="0" h="120000" w="120000">
-                <a:moveTo>
-                  <a:pt x="0" y="0"/>
-                </a:moveTo>
-                <a:lnTo>
-                  <a:pt x="120000" y="0"/>
-                </a:lnTo>
-                <a:lnTo>
-                  <a:pt x="120000" y="120000"/>
-                </a:lnTo>
-                <a:lnTo>
-                  <a:pt x="0" y="120000"/>
-                </a:lnTo>
-                <a:close/>
-              </a:path>
-            </a:pathLst>
-          </a:custGeom>
-        </p:spPr>
-      </p:sp>
-      <p:sp>
-        <p:nvSpPr>
-          <p:cNvPr id="91" name="Google Shape;91;g2b98cac9cd8_0_27:notes"/>
-          <p:cNvSpPr txBox="1"/>
-          <p:nvPr>
-            <p:ph idx="1" type="body"/>
-          </p:nvPr>
-        </p:nvSpPr>
-        <p:spPr>
-          <a:xfrm>
-            <a:off x="685800" y="4343400"/>
-            <a:ext cx="5486400" cy="4114800"/>
-          </a:xfrm>
-          <a:prstGeom prst="rect">
-            <a:avLst/>
-          </a:prstGeom>
-        </p:spPr>
-        <p:txBody>
-          <a:bodyPr anchorCtr="0" anchor="t" bIns="91425" lIns="91425" spcFirstLastPara="1" rIns="91425" wrap="square" tIns="91425">
-            <a:noAutofit/>
-          </a:bodyPr>
-          <a:lstStyle/>
-          <a:p>
-            <a:pPr indent="0" lvl="0" marL="0" rtl="0" algn="l">
-              <a:spcBef>
-                <a:spcPts val="0"/>
-              </a:spcBef>
-              <a:spcAft>
-                <a:spcPts val="0"/>
-              </a:spcAft>
-              <a:buNone/>
-            </a:pPr>
-            <a:r>
-              <a:t/>
-            </a:r>
-            <a:endParaRPr/>
-          </a:p>
-        </p:txBody>
-      </p:sp>
-    </p:spTree>
-  </p:cSld>
-  <p:clrMapOvr>
-    <a:masterClrMapping/>
-  </p:clrMapOvr>
-</p:notes>
-</file>
-
-<file path=ppt/notesSlides/notesSlide7.xml><?xml version="1.0" encoding="utf-8"?>
-<p:notes xmlns:a="http://schemas.openxmlformats.org/drawingml/2006/main" xmlns:r="http://schemas.openxmlformats.org/officeDocument/2006/relationships" xmlns:mc="http://schemas.openxmlformats.org/markup-compatibility/2006" xmlns:mv="urn:schemas-microsoft-com:mac:vml" xmlns:p="http://schemas.openxmlformats.org/presentationml/2006/main" xmlns:c="http://schemas.openxmlformats.org/drawingml/2006/chart" xmlns:dgm="http://schemas.openxmlformats.org/drawingml/2006/diagram" xmlns:o="urn:schemas-microsoft-com:office:office" xmlns:v="urn:schemas-microsoft-com:vml" xmlns:pvml="urn:schemas-microsoft-com:office:powerpoint" xmlns:com="http://schemas.openxmlformats.org/drawingml/2006/compatibility" xmlns:p14="http://schemas.microsoft.com/office/powerpoint/2010/main" xmlns:p15="http://schemas.microsoft.com/office/powerpoint/2012/main" xmlns:ahyp="http://schemas.microsoft.com/office/drawing/2018/hyperlinkcolor" showMasterPhAnim="0" showMasterSp="0">
-  <p:cSld>
-    <p:spTree>
-      <p:nvGrpSpPr>
-        <p:cNvPr id="95" name="Shape 95"/>
-        <p:cNvGrpSpPr/>
-        <p:nvPr/>
-      </p:nvGrpSpPr>
-      <p:grpSpPr>
-        <a:xfrm>
-          <a:off x="0" y="0"/>
-          <a:ext cx="0" cy="0"/>
-          <a:chOff x="0" y="0"/>
-          <a:chExt cx="0" cy="0"/>
-        </a:xfrm>
-      </p:grpSpPr>
-      <p:sp>
-        <p:nvSpPr>
-          <p:cNvPr id="96" name="Google Shape;96;g26902ce950f_0_0:notes"/>
-          <p:cNvSpPr/>
-          <p:nvPr>
-            <p:ph idx="2" type="sldImg"/>
-          </p:nvPr>
-        </p:nvSpPr>
-        <p:spPr>
-          <a:xfrm>
-            <a:off x="381300" y="685800"/>
-            <a:ext cx="6096000" cy="3429000"/>
-          </a:xfrm>
-          <a:custGeom>
-            <a:rect b="b" l="l" r="r" t="t"/>
-            <a:pathLst>
-              <a:path extrusionOk="0" h="120000" w="120000">
-                <a:moveTo>
-                  <a:pt x="0" y="0"/>
-                </a:moveTo>
-                <a:lnTo>
-                  <a:pt x="120000" y="0"/>
-                </a:lnTo>
-                <a:lnTo>
-                  <a:pt x="120000" y="120000"/>
-                </a:lnTo>
-                <a:lnTo>
-                  <a:pt x="0" y="120000"/>
-                </a:lnTo>
-                <a:close/>
-              </a:path>
-            </a:pathLst>
-          </a:custGeom>
-        </p:spPr>
-      </p:sp>
-      <p:sp>
-        <p:nvSpPr>
-          <p:cNvPr id="97" name="Google Shape;97;g26902ce950f_0_0:notes"/>
-          <p:cNvSpPr txBox="1"/>
-          <p:nvPr>
-            <p:ph idx="1" type="body"/>
-          </p:nvPr>
-        </p:nvSpPr>
-        <p:spPr>
-          <a:xfrm>
-            <a:off x="685800" y="4343400"/>
-            <a:ext cx="5486400" cy="4114800"/>
-          </a:xfrm>
-          <a:prstGeom prst="rect">
-            <a:avLst/>
-          </a:prstGeom>
-        </p:spPr>
-        <p:txBody>
-          <a:bodyPr anchorCtr="0" anchor="t" bIns="91425" lIns="91425" spcFirstLastPara="1" rIns="91425" wrap="square" tIns="91425">
-            <a:noAutofit/>
-          </a:bodyPr>
-          <a:lstStyle/>
-          <a:p>
-            <a:pPr indent="0" lvl="0" marL="0" rtl="0" algn="l">
-              <a:spcBef>
-                <a:spcPts val="0"/>
-              </a:spcBef>
-              <a:spcAft>
-                <a:spcPts val="0"/>
-              </a:spcAft>
-              <a:buNone/>
-            </a:pPr>
-            <a:r>
-              <a:t/>
-            </a:r>
-            <a:endParaRPr/>
-          </a:p>
-        </p:txBody>
-      </p:sp>
-    </p:spTree>
-  </p:cSld>
-  <p:clrMapOvr>
-    <a:masterClrMapping/>
-  </p:clrMapOvr>
-</p:notes>
-</file>
-
-<file path=ppt/notesSlides/notesSlide8.xml><?xml version="1.0" encoding="utf-8"?>
-<p:notes xmlns:a="http://schemas.openxmlformats.org/drawingml/2006/main" xmlns:r="http://schemas.openxmlformats.org/officeDocument/2006/relationships" xmlns:mc="http://schemas.openxmlformats.org/markup-compatibility/2006" xmlns:mv="urn:schemas-microsoft-com:mac:vml" xmlns:p="http://schemas.openxmlformats.org/presentationml/2006/main" xmlns:c="http://schemas.openxmlformats.org/drawingml/2006/chart" xmlns:dgm="http://schemas.openxmlformats.org/drawingml/2006/diagram" xmlns:o="urn:schemas-microsoft-com:office:office" xmlns:v="urn:schemas-microsoft-com:vml" xmlns:pvml="urn:schemas-microsoft-com:office:powerpoint" xmlns:com="http://schemas.openxmlformats.org/drawingml/2006/compatibility" xmlns:p14="http://schemas.microsoft.com/office/powerpoint/2010/main" xmlns:p15="http://schemas.microsoft.com/office/powerpoint/2012/main" xmlns:ahyp="http://schemas.microsoft.com/office/drawing/2018/hyperlinkcolor" showMasterPhAnim="0" showMasterSp="0">
-  <p:cSld>
-    <p:spTree>
-      <p:nvGrpSpPr>
-        <p:cNvPr id="101" name="Shape 101"/>
-        <p:cNvGrpSpPr/>
-        <p:nvPr/>
-      </p:nvGrpSpPr>
-      <p:grpSpPr>
-        <a:xfrm>
-          <a:off x="0" y="0"/>
-          <a:ext cx="0" cy="0"/>
-          <a:chOff x="0" y="0"/>
-          <a:chExt cx="0" cy="0"/>
-        </a:xfrm>
-      </p:grpSpPr>
-      <p:sp>
-        <p:nvSpPr>
-          <p:cNvPr id="102" name="Google Shape;102;g2b98cac9cd8_0_6:notes"/>
-          <p:cNvSpPr/>
-          <p:nvPr>
-            <p:ph idx="2" type="sldImg"/>
-          </p:nvPr>
-        </p:nvSpPr>
-        <p:spPr>
-          <a:xfrm>
-            <a:off x="381300" y="685800"/>
-            <a:ext cx="6096000" cy="3429000"/>
-          </a:xfrm>
-          <a:custGeom>
-            <a:rect b="b" l="l" r="r" t="t"/>
-            <a:pathLst>
-              <a:path extrusionOk="0" h="120000" w="120000">
-                <a:moveTo>
-                  <a:pt x="0" y="0"/>
-                </a:moveTo>
-                <a:lnTo>
-                  <a:pt x="120000" y="0"/>
-                </a:lnTo>
-                <a:lnTo>
-                  <a:pt x="120000" y="120000"/>
-                </a:lnTo>
-                <a:lnTo>
-                  <a:pt x="0" y="120000"/>
-                </a:lnTo>
-                <a:close/>
-              </a:path>
-            </a:pathLst>
-          </a:custGeom>
-        </p:spPr>
-      </p:sp>
-      <p:sp>
-        <p:nvSpPr>
-          <p:cNvPr id="103" name="Google Shape;103;g2b98cac9cd8_0_6:notes"/>
-          <p:cNvSpPr txBox="1"/>
-          <p:nvPr>
-            <p:ph idx="1" type="body"/>
-          </p:nvPr>
-        </p:nvSpPr>
-        <p:spPr>
-          <a:xfrm>
-            <a:off x="685800" y="4343400"/>
-            <a:ext cx="5486400" cy="4114800"/>
-          </a:xfrm>
-          <a:prstGeom prst="rect">
-            <a:avLst/>
-          </a:prstGeom>
-        </p:spPr>
-        <p:txBody>
-          <a:bodyPr anchorCtr="0" anchor="t" bIns="91425" lIns="91425" spcFirstLastPara="1" rIns="91425" wrap="square" tIns="91425">
-            <a:noAutofit/>
-          </a:bodyPr>
-          <a:lstStyle/>
-          <a:p>
-            <a:pPr indent="0" lvl="0" marL="0" rtl="0" algn="l">
-              <a:spcBef>
-                <a:spcPts val="0"/>
-              </a:spcBef>
-              <a:spcAft>
-                <a:spcPts val="0"/>
-              </a:spcAft>
-              <a:buNone/>
-            </a:pPr>
-            <a:r>
-              <a:t/>
-            </a:r>
-            <a:endParaRPr/>
-          </a:p>
-        </p:txBody>
-      </p:sp>
-    </p:spTree>
-  </p:cSld>
-  <p:clrMapOvr>
-    <a:masterClrMapping/>
-  </p:clrMapOvr>
-</p:notes>
-</file>
-
-<file path=ppt/notesSlides/notesSlide9.xml><?xml version="1.0" encoding="utf-8"?>
-<p:notes xmlns:a="http://schemas.openxmlformats.org/drawingml/2006/main" xmlns:r="http://schemas.openxmlformats.org/officeDocument/2006/relationships" xmlns:mc="http://schemas.openxmlformats.org/markup-compatibility/2006" xmlns:mv="urn:schemas-microsoft-com:mac:vml" xmlns:p="http://schemas.openxmlformats.org/presentationml/2006/main" xmlns:c="http://schemas.openxmlformats.org/drawingml/2006/chart" xmlns:dgm="http://schemas.openxmlformats.org/drawingml/2006/diagram" xmlns:o="urn:schemas-microsoft-com:office:office" xmlns:v="urn:schemas-microsoft-com:vml" xmlns:pvml="urn:schemas-microsoft-com:office:powerpoint" xmlns:com="http://schemas.openxmlformats.org/drawingml/2006/compatibility" xmlns:p14="http://schemas.microsoft.com/office/powerpoint/2010/main" xmlns:p15="http://schemas.microsoft.com/office/powerpoint/2012/main" xmlns:ahyp="http://schemas.microsoft.com/office/drawing/2018/hyperlinkcolor" showMasterPhAnim="0" showMasterSp="0">
-  <p:cSld>
-    <p:spTree>
-      <p:nvGrpSpPr>
-        <p:cNvPr id="107" name="Shape 107"/>
-        <p:cNvGrpSpPr/>
-        <p:nvPr/>
-      </p:nvGrpSpPr>
-      <p:grpSpPr>
-        <a:xfrm>
-          <a:off x="0" y="0"/>
-          <a:ext cx="0" cy="0"/>
-          <a:chOff x="0" y="0"/>
-          <a:chExt cx="0" cy="0"/>
-        </a:xfrm>
-      </p:grpSpPr>
-      <p:sp>
-        <p:nvSpPr>
-          <p:cNvPr id="108" name="Google Shape;108;g2b98cac9cd8_0_32:notes"/>
-          <p:cNvSpPr/>
-          <p:nvPr>
-            <p:ph idx="2" type="sldImg"/>
-          </p:nvPr>
-        </p:nvSpPr>
-        <p:spPr>
-          <a:xfrm>
-            <a:off x="381300" y="685800"/>
-            <a:ext cx="6096000" cy="3429000"/>
-          </a:xfrm>
-          <a:custGeom>
-            <a:rect b="b" l="l" r="r" t="t"/>
-            <a:pathLst>
-              <a:path extrusionOk="0" h="120000" w="120000">
-                <a:moveTo>
-                  <a:pt x="0" y="0"/>
-                </a:moveTo>
-                <a:lnTo>
-                  <a:pt x="120000" y="0"/>
-                </a:lnTo>
-                <a:lnTo>
-                  <a:pt x="120000" y="120000"/>
-                </a:lnTo>
-                <a:lnTo>
-                  <a:pt x="0" y="120000"/>
-                </a:lnTo>
-                <a:close/>
-              </a:path>
-            </a:pathLst>
-          </a:custGeom>
-        </p:spPr>
-      </p:sp>
-      <p:sp>
-        <p:nvSpPr>
-          <p:cNvPr id="109" name="Google Shape;109;g2b98cac9cd8_0_32:notes"/>
+          <p:cNvPr id="84" name="Google Shape;84;g26902ce950f_0_0:notes"/>
           <p:cNvSpPr txBox="1"/>
           <p:nvPr>
             <p:ph idx="1" type="body"/>
@@ -6849,7 +6449,7 @@
             </a:pPr>
             <a:r>
               <a:rPr lang="en"/>
-              <a:t>February 15, 2024</a:t>
+              <a:t>February 20, 2025</a:t>
             </a:r>
             <a:endParaRPr/>
           </a:p>
@@ -6890,186 +6490,6 @@
         </p:nvSpPr>
         <p:spPr>
           <a:xfrm>
-            <a:off x="311700" y="445025"/>
-            <a:ext cx="8520600" cy="572700"/>
-          </a:xfrm>
-          <a:prstGeom prst="rect">
-            <a:avLst/>
-          </a:prstGeom>
-        </p:spPr>
-        <p:txBody>
-          <a:bodyPr anchorCtr="0" anchor="t" bIns="91425" lIns="91425" spcFirstLastPara="1" rIns="91425" wrap="square" tIns="91425">
-            <a:normAutofit fontScale="90000"/>
-          </a:bodyPr>
-          <a:lstStyle/>
-          <a:p>
-            <a:pPr indent="0" lvl="0" marL="0" rtl="0" algn="l">
-              <a:spcBef>
-                <a:spcPts val="0"/>
-              </a:spcBef>
-              <a:spcAft>
-                <a:spcPts val="0"/>
-              </a:spcAft>
-              <a:buNone/>
-            </a:pPr>
-            <a:r>
-              <a:rPr lang="en"/>
-              <a:t>Hope you had a happy Python &amp; bash Valentine’s Day!</a:t>
-            </a:r>
-            <a:endParaRPr/>
-          </a:p>
-        </p:txBody>
-      </p:sp>
-      <p:sp>
-        <p:nvSpPr>
-          <p:cNvPr id="70" name="Google Shape;70;p14"/>
-          <p:cNvSpPr/>
-          <p:nvPr/>
-        </p:nvSpPr>
-        <p:spPr>
-          <a:xfrm>
-            <a:off x="2753100" y="1666475"/>
-            <a:ext cx="3637800" cy="2864400"/>
-          </a:xfrm>
-          <a:prstGeom prst="heart">
-            <a:avLst/>
-          </a:prstGeom>
-          <a:solidFill>
-            <a:srgbClr val="FFF2CC"/>
-          </a:solidFill>
-          <a:ln cap="flat" cmpd="sng" w="9525">
-            <a:solidFill>
-              <a:srgbClr val="FFE599"/>
-            </a:solidFill>
-            <a:prstDash val="solid"/>
-            <a:round/>
-            <a:headEnd len="sm" w="sm" type="none"/>
-            <a:tailEnd len="sm" w="sm" type="none"/>
-          </a:ln>
-        </p:spPr>
-        <p:txBody>
-          <a:bodyPr anchorCtr="0" anchor="ctr" bIns="91425" lIns="91425" spcFirstLastPara="1" rIns="91425" wrap="square" tIns="91425">
-            <a:noAutofit/>
-          </a:bodyPr>
-          <a:lstStyle/>
-          <a:p>
-            <a:pPr indent="0" lvl="0" marL="0" rtl="0" algn="ctr">
-              <a:spcBef>
-                <a:spcPts val="0"/>
-              </a:spcBef>
-              <a:spcAft>
-                <a:spcPts val="0"/>
-              </a:spcAft>
-              <a:buNone/>
-            </a:pPr>
-            <a:r>
-              <a:t/>
-            </a:r>
-            <a:endParaRPr/>
-          </a:p>
-        </p:txBody>
-      </p:sp>
-      <p:sp>
-        <p:nvSpPr>
-          <p:cNvPr id="71" name="Google Shape;71;p14"/>
-          <p:cNvSpPr/>
-          <p:nvPr/>
-        </p:nvSpPr>
-        <p:spPr>
-          <a:xfrm>
-            <a:off x="2930400" y="1881425"/>
-            <a:ext cx="3283200" cy="2575200"/>
-          </a:xfrm>
-          <a:prstGeom prst="heart">
-            <a:avLst/>
-          </a:prstGeom>
-          <a:solidFill>
-            <a:srgbClr val="C9DAF8"/>
-          </a:solidFill>
-          <a:ln cap="flat" cmpd="sng" w="9525">
-            <a:solidFill>
-              <a:srgbClr val="C9DAF8"/>
-            </a:solidFill>
-            <a:prstDash val="solid"/>
-            <a:round/>
-            <a:headEnd len="sm" w="sm" type="none"/>
-            <a:tailEnd len="sm" w="sm" type="none"/>
-          </a:ln>
-        </p:spPr>
-        <p:txBody>
-          <a:bodyPr anchorCtr="0" anchor="ctr" bIns="91425" lIns="91425" spcFirstLastPara="1" rIns="91425" wrap="square" tIns="91425">
-            <a:noAutofit/>
-          </a:bodyPr>
-          <a:lstStyle/>
-          <a:p>
-            <a:pPr indent="0" lvl="0" marL="0" rtl="0" algn="ctr">
-              <a:spcBef>
-                <a:spcPts val="0"/>
-              </a:spcBef>
-              <a:spcAft>
-                <a:spcPts val="0"/>
-              </a:spcAft>
-              <a:buNone/>
-            </a:pPr>
-            <a:r>
-              <a:rPr b="1" lang="en" sz="5000">
-                <a:solidFill>
-                  <a:schemeClr val="lt1"/>
-                </a:solidFill>
-                <a:latin typeface="Comic Sans MS"/>
-                <a:ea typeface="Comic Sans MS"/>
-                <a:cs typeface="Comic Sans MS"/>
-                <a:sym typeface="Comic Sans MS"/>
-              </a:rPr>
-              <a:t>for</a:t>
-            </a:r>
-            <a:endParaRPr b="1" sz="5000">
-              <a:solidFill>
-                <a:schemeClr val="lt1"/>
-              </a:solidFill>
-              <a:latin typeface="Comic Sans MS"/>
-              <a:ea typeface="Comic Sans MS"/>
-              <a:cs typeface="Comic Sans MS"/>
-              <a:sym typeface="Comic Sans MS"/>
-            </a:endParaRPr>
-          </a:p>
-        </p:txBody>
-      </p:sp>
-    </p:spTree>
-  </p:cSld>
-  <p:clrMapOvr>
-    <a:masterClrMapping/>
-  </p:clrMapOvr>
-</p:sld>
-</file>
-
-<file path=ppt/slides/slide3.xml><?xml version="1.0" encoding="utf-8"?>
-<p:sld xmlns:a="http://schemas.openxmlformats.org/drawingml/2006/main" xmlns:r="http://schemas.openxmlformats.org/officeDocument/2006/relationships" xmlns:mc="http://schemas.openxmlformats.org/markup-compatibility/2006" xmlns:mv="urn:schemas-microsoft-com:mac:vml" xmlns:p="http://schemas.openxmlformats.org/presentationml/2006/main" xmlns:c="http://schemas.openxmlformats.org/drawingml/2006/chart" xmlns:dgm="http://schemas.openxmlformats.org/drawingml/2006/diagram" xmlns:o="urn:schemas-microsoft-com:office:office" xmlns:v="urn:schemas-microsoft-com:vml" xmlns:pvml="urn:schemas-microsoft-com:office:powerpoint" xmlns:com="http://schemas.openxmlformats.org/drawingml/2006/compatibility" xmlns:p14="http://schemas.microsoft.com/office/powerpoint/2010/main" xmlns:p15="http://schemas.microsoft.com/office/powerpoint/2012/main" xmlns:ahyp="http://schemas.microsoft.com/office/drawing/2018/hyperlinkcolor">
-  <p:cSld>
-    <p:spTree>
-      <p:nvGrpSpPr>
-        <p:cNvPr id="75" name="Shape 75"/>
-        <p:cNvGrpSpPr/>
-        <p:nvPr/>
-      </p:nvGrpSpPr>
-      <p:grpSpPr>
-        <a:xfrm>
-          <a:off x="0" y="0"/>
-          <a:ext cx="0" cy="0"/>
-          <a:chOff x="0" y="0"/>
-          <a:chExt cx="0" cy="0"/>
-        </a:xfrm>
-      </p:grpSpPr>
-      <p:sp>
-        <p:nvSpPr>
-          <p:cNvPr id="76" name="Google Shape;76;p15"/>
-          <p:cNvSpPr txBox="1"/>
-          <p:nvPr>
-            <p:ph type="title"/>
-          </p:nvPr>
-        </p:nvSpPr>
-        <p:spPr>
-          <a:xfrm>
             <a:off x="311700" y="2285400"/>
             <a:ext cx="8520600" cy="572700"/>
           </a:xfrm>
@@ -7108,12 +6528,12 @@
 </p:sld>
 </file>
 
-<file path=ppt/slides/slide4.xml><?xml version="1.0" encoding="utf-8"?>
+<file path=ppt/slides/slide3.xml><?xml version="1.0" encoding="utf-8"?>
 <p:sld xmlns:a="http://schemas.openxmlformats.org/drawingml/2006/main" xmlns:r="http://schemas.openxmlformats.org/officeDocument/2006/relationships" xmlns:mc="http://schemas.openxmlformats.org/markup-compatibility/2006" xmlns:mv="urn:schemas-microsoft-com:mac:vml" xmlns:p="http://schemas.openxmlformats.org/presentationml/2006/main" xmlns:c="http://schemas.openxmlformats.org/drawingml/2006/chart" xmlns:dgm="http://schemas.openxmlformats.org/drawingml/2006/diagram" xmlns:o="urn:schemas-microsoft-com:office:office" xmlns:v="urn:schemas-microsoft-com:vml" xmlns:pvml="urn:schemas-microsoft-com:office:powerpoint" xmlns:com="http://schemas.openxmlformats.org/drawingml/2006/compatibility" xmlns:p14="http://schemas.microsoft.com/office/powerpoint/2010/main" xmlns:p15="http://schemas.microsoft.com/office/powerpoint/2012/main" xmlns:ahyp="http://schemas.microsoft.com/office/drawing/2018/hyperlinkcolor">
   <p:cSld>
     <p:spTree>
       <p:nvGrpSpPr>
-        <p:cNvPr id="80" name="Shape 80"/>
+        <p:cNvPr id="73" name="Shape 73"/>
         <p:cNvGrpSpPr/>
         <p:nvPr/>
       </p:nvGrpSpPr>
@@ -7127,7 +6547,7 @@
       </p:grpSpPr>
       <p:sp>
         <p:nvSpPr>
-          <p:cNvPr id="81" name="Google Shape;81;p16"/>
+          <p:cNvPr id="74" name="Google Shape;74;p15"/>
           <p:cNvSpPr txBox="1"/>
           <p:nvPr>
             <p:ph type="title"/>
@@ -7159,7 +6579,7 @@
             </a:pPr>
             <a:r>
               <a:rPr lang="en"/>
-              <a:t>Error on the website: Final Presentations</a:t>
+              <a:t>Reminder: Final Presentation Date</a:t>
             </a:r>
             <a:endParaRPr/>
           </a:p>
@@ -7167,7 +6587,7 @@
       </p:sp>
       <p:sp>
         <p:nvSpPr>
-          <p:cNvPr id="82" name="Google Shape;82;p16"/>
+          <p:cNvPr id="75" name="Google Shape;75;p15"/>
           <p:cNvSpPr txBox="1"/>
           <p:nvPr>
             <p:ph idx="1" type="body"/>
@@ -7199,7 +6619,7 @@
             </a:pPr>
             <a:r>
               <a:rPr lang="en"/>
-              <a:t>Final presentations will be Wednesday March 13, 5-8pm, as on the calendar.</a:t>
+              <a:t>Final presentations will be Thursday March 20, 5-8pm, as on the calendar and course website.</a:t>
             </a:r>
             <a:endParaRPr/>
           </a:p>
@@ -7215,7 +6635,7 @@
             </a:pPr>
             <a:r>
               <a:rPr lang="en"/>
-              <a:t>	NOT 6-8:30pm as on the syllabus - whoops!</a:t>
+              <a:t>	NOT as on MyUW</a:t>
             </a:r>
             <a:endParaRPr/>
           </a:p>
@@ -7245,12 +6665,12 @@
 </p:sld>
 </file>
 
-<file path=ppt/slides/slide5.xml><?xml version="1.0" encoding="utf-8"?>
+<file path=ppt/slides/slide4.xml><?xml version="1.0" encoding="utf-8"?>
 <p:sld xmlns:a="http://schemas.openxmlformats.org/drawingml/2006/main" xmlns:r="http://schemas.openxmlformats.org/officeDocument/2006/relationships" xmlns:mc="http://schemas.openxmlformats.org/markup-compatibility/2006" xmlns:mv="urn:schemas-microsoft-com:mac:vml" xmlns:p="http://schemas.openxmlformats.org/presentationml/2006/main" xmlns:c="http://schemas.openxmlformats.org/drawingml/2006/chart" xmlns:dgm="http://schemas.openxmlformats.org/drawingml/2006/diagram" xmlns:o="urn:schemas-microsoft-com:office:office" xmlns:v="urn:schemas-microsoft-com:vml" xmlns:pvml="urn:schemas-microsoft-com:office:powerpoint" xmlns:com="http://schemas.openxmlformats.org/drawingml/2006/compatibility" xmlns:p14="http://schemas.microsoft.com/office/powerpoint/2010/main" xmlns:p15="http://schemas.microsoft.com/office/powerpoint/2012/main" xmlns:ahyp="http://schemas.microsoft.com/office/drawing/2018/hyperlinkcolor">
   <p:cSld>
     <p:spTree>
       <p:nvGrpSpPr>
-        <p:cNvPr id="86" name="Shape 86"/>
+        <p:cNvPr id="79" name="Shape 79"/>
         <p:cNvGrpSpPr/>
         <p:nvPr/>
       </p:nvGrpSpPr>
@@ -7264,7 +6684,7 @@
       </p:grpSpPr>
       <p:sp>
         <p:nvSpPr>
-          <p:cNvPr id="87" name="Google Shape;87;p17"/>
+          <p:cNvPr id="80" name="Google Shape;80;p16"/>
           <p:cNvSpPr txBox="1"/>
           <p:nvPr>
             <p:ph type="title"/>
@@ -7296,7 +6716,7 @@
             </a:pPr>
             <a:r>
               <a:rPr lang="en"/>
-              <a:t>Guest lecture for final class (3/7)</a:t>
+              <a:t>Due today: project software design exercise</a:t>
             </a:r>
             <a:endParaRPr/>
           </a:p>
@@ -7304,7 +6724,7 @@
       </p:sp>
       <p:sp>
         <p:nvSpPr>
-          <p:cNvPr id="88" name="Google Shape;88;p17"/>
+          <p:cNvPr id="81" name="Google Shape;81;p16"/>
           <p:cNvSpPr txBox="1"/>
           <p:nvPr>
             <p:ph idx="1" type="body"/>
@@ -7325,55 +6745,55 @@
           </a:bodyPr>
           <a:lstStyle/>
           <a:p>
-            <a:pPr indent="-374650" lvl="0" marL="457200" rtl="0" algn="l">
-              <a:spcBef>
-                <a:spcPts val="0"/>
-              </a:spcBef>
-              <a:spcAft>
-                <a:spcPts val="0"/>
-              </a:spcAft>
-              <a:buSzPts val="2300"/>
+            <a:pPr indent="-368300" lvl="0" marL="457200" rtl="0" algn="l">
+              <a:spcBef>
+                <a:spcPts val="0"/>
+              </a:spcBef>
+              <a:spcAft>
+                <a:spcPts val="0"/>
+              </a:spcAft>
+              <a:buSzPts val="2200"/>
               <a:buChar char="●"/>
             </a:pPr>
             <a:r>
-              <a:rPr lang="en" sz="2300"/>
-              <a:t>Data Scientist at Spotify</a:t>
+              <a:rPr lang="en" sz="2200"/>
+              <a:t>You’ve uploaded to GitHub, right?</a:t>
             </a:r>
-            <a:endParaRPr sz="2300"/>
+            <a:endParaRPr sz="2200"/>
           </a:p>
           <a:p>
-            <a:pPr indent="-374650" lvl="0" marL="457200" rtl="0" algn="l">
-              <a:spcBef>
-                <a:spcPts val="0"/>
-              </a:spcBef>
-              <a:spcAft>
-                <a:spcPts val="0"/>
-              </a:spcAft>
-              <a:buSzPts val="2300"/>
+            <a:pPr indent="-368300" lvl="0" marL="457200" rtl="0" algn="l">
+              <a:spcBef>
+                <a:spcPts val="0"/>
+              </a:spcBef>
+              <a:spcAft>
+                <a:spcPts val="0"/>
+              </a:spcAft>
+              <a:buSzPts val="2200"/>
               <a:buChar char="●"/>
             </a:pPr>
             <a:r>
-              <a:rPr lang="en" sz="2300"/>
-              <a:t>Let us know what you’re interested in hearing about!</a:t>
+              <a:rPr lang="en" sz="2200"/>
+              <a:t>We’ll take a look and give you a grade, as well as any notes on your proposed design.</a:t>
             </a:r>
-            <a:endParaRPr sz="2300"/>
+            <a:endParaRPr sz="2200"/>
           </a:p>
           <a:p>
-            <a:pPr indent="-349250" lvl="1" marL="914400" rtl="0" algn="l">
-              <a:spcBef>
-                <a:spcPts val="0"/>
-              </a:spcBef>
-              <a:spcAft>
-                <a:spcPts val="0"/>
-              </a:spcAft>
-              <a:buSzPts val="1900"/>
-              <a:buChar char="○"/>
+            <a:pPr indent="-368300" lvl="0" marL="457200" rtl="0" algn="l">
+              <a:spcBef>
+                <a:spcPts val="0"/>
+              </a:spcBef>
+              <a:spcAft>
+                <a:spcPts val="0"/>
+              </a:spcAft>
+              <a:buSzPts val="2200"/>
+              <a:buChar char="●"/>
             </a:pPr>
             <a:r>
-              <a:rPr lang="en" sz="1900"/>
-              <a:t>Add your questions in the survey on the Syllabus</a:t>
+              <a:rPr lang="en" sz="2200"/>
+              <a:t>You may fix any issues for regrade during the final project evaluation</a:t>
             </a:r>
-            <a:endParaRPr sz="1900"/>
+            <a:endParaRPr sz="2200"/>
           </a:p>
         </p:txBody>
       </p:sp>
@@ -7385,12 +6805,12 @@
 </p:sld>
 </file>
 
-<file path=ppt/slides/slide6.xml><?xml version="1.0" encoding="utf-8"?>
+<file path=ppt/slides/slide5.xml><?xml version="1.0" encoding="utf-8"?>
 <p:sld xmlns:a="http://schemas.openxmlformats.org/drawingml/2006/main" xmlns:r="http://schemas.openxmlformats.org/officeDocument/2006/relationships" xmlns:mc="http://schemas.openxmlformats.org/markup-compatibility/2006" xmlns:mv="urn:schemas-microsoft-com:mac:vml" xmlns:p="http://schemas.openxmlformats.org/presentationml/2006/main" xmlns:c="http://schemas.openxmlformats.org/drawingml/2006/chart" xmlns:dgm="http://schemas.openxmlformats.org/drawingml/2006/diagram" xmlns:o="urn:schemas-microsoft-com:office:office" xmlns:v="urn:schemas-microsoft-com:vml" xmlns:pvml="urn:schemas-microsoft-com:office:powerpoint" xmlns:com="http://schemas.openxmlformats.org/drawingml/2006/compatibility" xmlns:p14="http://schemas.microsoft.com/office/powerpoint/2010/main" xmlns:p15="http://schemas.microsoft.com/office/powerpoint/2012/main" xmlns:ahyp="http://schemas.microsoft.com/office/drawing/2018/hyperlinkcolor">
   <p:cSld>
     <p:spTree>
       <p:nvGrpSpPr>
-        <p:cNvPr id="92" name="Shape 92"/>
+        <p:cNvPr id="85" name="Shape 85"/>
         <p:cNvGrpSpPr/>
         <p:nvPr/>
       </p:nvGrpSpPr>
@@ -7404,7 +6824,7 @@
       </p:grpSpPr>
       <p:sp>
         <p:nvSpPr>
-          <p:cNvPr id="93" name="Google Shape;93;p18"/>
+          <p:cNvPr id="86" name="Google Shape;86;p17"/>
           <p:cNvSpPr txBox="1"/>
           <p:nvPr>
             <p:ph type="title"/>
@@ -7436,7 +6856,7 @@
             </a:pPr>
             <a:r>
               <a:rPr lang="en"/>
-              <a:t>Due today: project software design exercise</a:t>
+              <a:t>Next week: initial project demo</a:t>
             </a:r>
             <a:endParaRPr/>
           </a:p>
@@ -7444,7 +6864,7 @@
       </p:sp>
       <p:sp>
         <p:nvSpPr>
-          <p:cNvPr id="94" name="Google Shape;94;p18"/>
+          <p:cNvPr id="87" name="Google Shape;87;p17"/>
           <p:cNvSpPr txBox="1"/>
           <p:nvPr>
             <p:ph idx="1" type="body"/>
@@ -7453,7 +6873,7 @@
         <p:spPr>
           <a:xfrm>
             <a:off x="311700" y="1152475"/>
-            <a:ext cx="8520600" cy="3416400"/>
+            <a:ext cx="8520600" cy="3837300"/>
           </a:xfrm>
           <a:prstGeom prst="rect">
             <a:avLst/>
@@ -7477,147 +6897,7 @@
             </a:pPr>
             <a:r>
               <a:rPr lang="en" sz="2200"/>
-              <a:t>You’ve uploaded to GitHub, right?</a:t>
-            </a:r>
-            <a:endParaRPr sz="2200"/>
-          </a:p>
-          <a:p>
-            <a:pPr indent="-368300" lvl="0" marL="457200" rtl="0" algn="l">
-              <a:spcBef>
-                <a:spcPts val="0"/>
-              </a:spcBef>
-              <a:spcAft>
-                <a:spcPts val="0"/>
-              </a:spcAft>
-              <a:buSzPts val="2200"/>
-              <a:buChar char="●"/>
-            </a:pPr>
-            <a:r>
-              <a:rPr lang="en" sz="2200"/>
-              <a:t>We’ll take a look and give you a grade, as well as any notes on your proposed design.</a:t>
-            </a:r>
-            <a:endParaRPr sz="2200"/>
-          </a:p>
-          <a:p>
-            <a:pPr indent="-368300" lvl="0" marL="457200" rtl="0" algn="l">
-              <a:spcBef>
-                <a:spcPts val="0"/>
-              </a:spcBef>
-              <a:spcAft>
-                <a:spcPts val="0"/>
-              </a:spcAft>
-              <a:buSzPts val="2200"/>
-              <a:buChar char="●"/>
-            </a:pPr>
-            <a:r>
-              <a:rPr lang="en" sz="2200"/>
-              <a:t>You may fix any issues for regrade during the final project evaluation</a:t>
-            </a:r>
-            <a:endParaRPr sz="2200"/>
-          </a:p>
-        </p:txBody>
-      </p:sp>
-    </p:spTree>
-  </p:cSld>
-  <p:clrMapOvr>
-    <a:masterClrMapping/>
-  </p:clrMapOvr>
-</p:sld>
-</file>
-
-<file path=ppt/slides/slide7.xml><?xml version="1.0" encoding="utf-8"?>
-<p:sld xmlns:a="http://schemas.openxmlformats.org/drawingml/2006/main" xmlns:r="http://schemas.openxmlformats.org/officeDocument/2006/relationships" xmlns:mc="http://schemas.openxmlformats.org/markup-compatibility/2006" xmlns:mv="urn:schemas-microsoft-com:mac:vml" xmlns:p="http://schemas.openxmlformats.org/presentationml/2006/main" xmlns:c="http://schemas.openxmlformats.org/drawingml/2006/chart" xmlns:dgm="http://schemas.openxmlformats.org/drawingml/2006/diagram" xmlns:o="urn:schemas-microsoft-com:office:office" xmlns:v="urn:schemas-microsoft-com:vml" xmlns:pvml="urn:schemas-microsoft-com:office:powerpoint" xmlns:com="http://schemas.openxmlformats.org/drawingml/2006/compatibility" xmlns:p14="http://schemas.microsoft.com/office/powerpoint/2010/main" xmlns:p15="http://schemas.microsoft.com/office/powerpoint/2012/main" xmlns:ahyp="http://schemas.microsoft.com/office/drawing/2018/hyperlinkcolor">
-  <p:cSld>
-    <p:spTree>
-      <p:nvGrpSpPr>
-        <p:cNvPr id="98" name="Shape 98"/>
-        <p:cNvGrpSpPr/>
-        <p:nvPr/>
-      </p:nvGrpSpPr>
-      <p:grpSpPr>
-        <a:xfrm>
-          <a:off x="0" y="0"/>
-          <a:ext cx="0" cy="0"/>
-          <a:chOff x="0" y="0"/>
-          <a:chExt cx="0" cy="0"/>
-        </a:xfrm>
-      </p:grpSpPr>
-      <p:sp>
-        <p:nvSpPr>
-          <p:cNvPr id="99" name="Google Shape;99;p19"/>
-          <p:cNvSpPr txBox="1"/>
-          <p:nvPr>
-            <p:ph type="title"/>
-          </p:nvPr>
-        </p:nvSpPr>
-        <p:spPr>
-          <a:xfrm>
-            <a:off x="311700" y="445025"/>
-            <a:ext cx="8520600" cy="572700"/>
-          </a:xfrm>
-          <a:prstGeom prst="rect">
-            <a:avLst/>
-          </a:prstGeom>
-        </p:spPr>
-        <p:txBody>
-          <a:bodyPr anchorCtr="0" anchor="t" bIns="91425" lIns="91425" spcFirstLastPara="1" rIns="91425" wrap="square" tIns="91425">
-            <a:normAutofit fontScale="90000"/>
-          </a:bodyPr>
-          <a:lstStyle/>
-          <a:p>
-            <a:pPr indent="0" lvl="0" marL="0" rtl="0" algn="l">
-              <a:spcBef>
-                <a:spcPts val="0"/>
-              </a:spcBef>
-              <a:spcAft>
-                <a:spcPts val="0"/>
-              </a:spcAft>
-              <a:buNone/>
-            </a:pPr>
-            <a:r>
-              <a:rPr lang="en"/>
-              <a:t>Next week: initial project demo</a:t>
-            </a:r>
-            <a:endParaRPr/>
-          </a:p>
-        </p:txBody>
-      </p:sp>
-      <p:sp>
-        <p:nvSpPr>
-          <p:cNvPr id="100" name="Google Shape;100;p19"/>
-          <p:cNvSpPr txBox="1"/>
-          <p:nvPr>
-            <p:ph idx="1" type="body"/>
-          </p:nvPr>
-        </p:nvSpPr>
-        <p:spPr>
-          <a:xfrm>
-            <a:off x="311700" y="1152475"/>
-            <a:ext cx="8520600" cy="3416400"/>
-          </a:xfrm>
-          <a:prstGeom prst="rect">
-            <a:avLst/>
-          </a:prstGeom>
-        </p:spPr>
-        <p:txBody>
-          <a:bodyPr anchorCtr="0" anchor="t" bIns="91425" lIns="91425" spcFirstLastPara="1" rIns="91425" wrap="square" tIns="91425">
-            <a:normAutofit/>
-          </a:bodyPr>
-          <a:lstStyle/>
-          <a:p>
-            <a:pPr indent="-368300" lvl="0" marL="457200" rtl="0" algn="l">
-              <a:spcBef>
-                <a:spcPts val="0"/>
-              </a:spcBef>
-              <a:spcAft>
-                <a:spcPts val="0"/>
-              </a:spcAft>
-              <a:buSzPts val="2200"/>
-              <a:buChar char="●"/>
-            </a:pPr>
-            <a:r>
-              <a:rPr lang="en" sz="2200"/>
-              <a:t>Goal: show off what you’ve done so far</a:t>
+              <a:t>Goal: show off what you’ve done so far + Technology Review</a:t>
             </a:r>
             <a:endParaRPr sz="2200"/>
           </a:p>
@@ -7681,6 +6961,23 @@
             <a:endParaRPr sz="1800"/>
           </a:p>
           <a:p>
+            <a:pPr indent="-342900" lvl="1" marL="914400" rtl="0" algn="l">
+              <a:spcBef>
+                <a:spcPts val="0"/>
+              </a:spcBef>
+              <a:spcAft>
+                <a:spcPts val="0"/>
+              </a:spcAft>
+              <a:buSzPts val="1800"/>
+              <a:buChar char="○"/>
+            </a:pPr>
+            <a:r>
+              <a:rPr lang="en" sz="1800"/>
+              <a:t>Be prepared to talk through your Technology Review</a:t>
+            </a:r>
+            <a:endParaRPr sz="1800"/>
+          </a:p>
+          <a:p>
             <a:pPr indent="-368300" lvl="0" marL="457200" rtl="0" algn="l">
               <a:spcBef>
                 <a:spcPts val="0"/>
@@ -7710,7 +7007,7 @@
             </a:pPr>
             <a:r>
               <a:rPr lang="en" sz="1800"/>
-              <a:t>The TAs and I will walk around the room</a:t>
+              <a:t>The TA and I will walk around the room</a:t>
             </a:r>
             <a:endParaRPr sz="1800"/>
           </a:p>
@@ -7727,7 +7024,7 @@
             </a:pPr>
             <a:r>
               <a:rPr lang="en" sz="1800"/>
-              <a:t>You’ll demonstrate your project to either a TA, or both a TA and me</a:t>
+              <a:t>You’ll demonstrate your project to either the TA, or both a TA and me</a:t>
             </a:r>
             <a:endParaRPr sz="1800"/>
           </a:p>
@@ -7764,282 +7061,6 @@
               <a:t>Grading: participation</a:t>
             </a:r>
             <a:endParaRPr sz="2200"/>
-          </a:p>
-        </p:txBody>
-      </p:sp>
-    </p:spTree>
-  </p:cSld>
-  <p:clrMapOvr>
-    <a:masterClrMapping/>
-  </p:clrMapOvr>
-</p:sld>
-</file>
-
-<file path=ppt/slides/slide8.xml><?xml version="1.0" encoding="utf-8"?>
-<p:sld xmlns:a="http://schemas.openxmlformats.org/drawingml/2006/main" xmlns:r="http://schemas.openxmlformats.org/officeDocument/2006/relationships" xmlns:mc="http://schemas.openxmlformats.org/markup-compatibility/2006" xmlns:mv="urn:schemas-microsoft-com:mac:vml" xmlns:p="http://schemas.openxmlformats.org/presentationml/2006/main" xmlns:c="http://schemas.openxmlformats.org/drawingml/2006/chart" xmlns:dgm="http://schemas.openxmlformats.org/drawingml/2006/diagram" xmlns:o="urn:schemas-microsoft-com:office:office" xmlns:v="urn:schemas-microsoft-com:vml" xmlns:pvml="urn:schemas-microsoft-com:office:powerpoint" xmlns:com="http://schemas.openxmlformats.org/drawingml/2006/compatibility" xmlns:p14="http://schemas.microsoft.com/office/powerpoint/2010/main" xmlns:p15="http://schemas.microsoft.com/office/powerpoint/2012/main" xmlns:ahyp="http://schemas.microsoft.com/office/drawing/2018/hyperlinkcolor">
-  <p:cSld>
-    <p:spTree>
-      <p:nvGrpSpPr>
-        <p:cNvPr id="104" name="Shape 104"/>
-        <p:cNvGrpSpPr/>
-        <p:nvPr/>
-      </p:nvGrpSpPr>
-      <p:grpSpPr>
-        <a:xfrm>
-          <a:off x="0" y="0"/>
-          <a:ext cx="0" cy="0"/>
-          <a:chOff x="0" y="0"/>
-          <a:chExt cx="0" cy="0"/>
-        </a:xfrm>
-      </p:grpSpPr>
-      <p:sp>
-        <p:nvSpPr>
-          <p:cNvPr id="105" name="Google Shape;105;p20"/>
-          <p:cNvSpPr txBox="1"/>
-          <p:nvPr>
-            <p:ph type="title"/>
-          </p:nvPr>
-        </p:nvSpPr>
-        <p:spPr>
-          <a:xfrm>
-            <a:off x="311700" y="445025"/>
-            <a:ext cx="8520600" cy="572700"/>
-          </a:xfrm>
-          <a:prstGeom prst="rect">
-            <a:avLst/>
-          </a:prstGeom>
-        </p:spPr>
-        <p:txBody>
-          <a:bodyPr anchorCtr="0" anchor="t" bIns="91425" lIns="91425" spcFirstLastPara="1" rIns="91425" wrap="square" tIns="91425">
-            <a:normAutofit fontScale="90000"/>
-          </a:bodyPr>
-          <a:lstStyle/>
-          <a:p>
-            <a:pPr indent="0" lvl="0" marL="0" rtl="0" algn="l">
-              <a:spcBef>
-                <a:spcPts val="0"/>
-              </a:spcBef>
-              <a:spcAft>
-                <a:spcPts val="0"/>
-              </a:spcAft>
-              <a:buNone/>
-            </a:pPr>
-            <a:r>
-              <a:rPr lang="en"/>
-              <a:t>Office hours: Melissa’s updated hours</a:t>
-            </a:r>
-            <a:endParaRPr/>
-          </a:p>
-        </p:txBody>
-      </p:sp>
-      <p:sp>
-        <p:nvSpPr>
-          <p:cNvPr id="106" name="Google Shape;106;p20"/>
-          <p:cNvSpPr txBox="1"/>
-          <p:nvPr>
-            <p:ph idx="1" type="body"/>
-          </p:nvPr>
-        </p:nvSpPr>
-        <p:spPr>
-          <a:xfrm>
-            <a:off x="311700" y="1152475"/>
-            <a:ext cx="8520600" cy="3416400"/>
-          </a:xfrm>
-          <a:prstGeom prst="rect">
-            <a:avLst/>
-          </a:prstGeom>
-        </p:spPr>
-        <p:txBody>
-          <a:bodyPr anchorCtr="0" anchor="t" bIns="91425" lIns="91425" spcFirstLastPara="1" rIns="91425" wrap="square" tIns="91425">
-            <a:normAutofit/>
-          </a:bodyPr>
-          <a:lstStyle/>
-          <a:p>
-            <a:pPr indent="0" lvl="0" marL="0" rtl="0" algn="l">
-              <a:spcBef>
-                <a:spcPts val="0"/>
-              </a:spcBef>
-              <a:spcAft>
-                <a:spcPts val="0"/>
-              </a:spcAft>
-              <a:buNone/>
-            </a:pPr>
-            <a:r>
-              <a:rPr lang="en"/>
-              <a:t>Monday evenings, 6-8pm on Zoom for next week</a:t>
-            </a:r>
-            <a:endParaRPr/>
-          </a:p>
-          <a:p>
-            <a:pPr indent="0" lvl="0" marL="0" rtl="0" algn="l">
-              <a:spcBef>
-                <a:spcPts val="1200"/>
-              </a:spcBef>
-              <a:spcAft>
-                <a:spcPts val="0"/>
-              </a:spcAft>
-              <a:buNone/>
-            </a:pPr>
-            <a:r>
-              <a:rPr lang="en"/>
-              <a:t>And of course always by appointment!</a:t>
-            </a:r>
-            <a:endParaRPr/>
-          </a:p>
-          <a:p>
-            <a:pPr indent="0" lvl="0" marL="0" rtl="0" algn="l">
-              <a:spcBef>
-                <a:spcPts val="1200"/>
-              </a:spcBef>
-              <a:spcAft>
-                <a:spcPts val="1200"/>
-              </a:spcAft>
-              <a:buNone/>
-            </a:pPr>
-            <a:r>
-              <a:rPr lang="en"/>
-              <a:t>Mithali’s office hours will be next Thursday 3:30-4:30pm for NEXT WEEK only - not Wednesday</a:t>
-            </a:r>
-            <a:endParaRPr/>
-          </a:p>
-        </p:txBody>
-      </p:sp>
-    </p:spTree>
-  </p:cSld>
-  <p:clrMapOvr>
-    <a:masterClrMapping/>
-  </p:clrMapOvr>
-</p:sld>
-</file>
-
-<file path=ppt/slides/slide9.xml><?xml version="1.0" encoding="utf-8"?>
-<p:sld xmlns:a="http://schemas.openxmlformats.org/drawingml/2006/main" xmlns:r="http://schemas.openxmlformats.org/officeDocument/2006/relationships" xmlns:mc="http://schemas.openxmlformats.org/markup-compatibility/2006" xmlns:mv="urn:schemas-microsoft-com:mac:vml" xmlns:p="http://schemas.openxmlformats.org/presentationml/2006/main" xmlns:c="http://schemas.openxmlformats.org/drawingml/2006/chart" xmlns:dgm="http://schemas.openxmlformats.org/drawingml/2006/diagram" xmlns:o="urn:schemas-microsoft-com:office:office" xmlns:v="urn:schemas-microsoft-com:vml" xmlns:pvml="urn:schemas-microsoft-com:office:powerpoint" xmlns:com="http://schemas.openxmlformats.org/drawingml/2006/compatibility" xmlns:p14="http://schemas.microsoft.com/office/powerpoint/2010/main" xmlns:p15="http://schemas.microsoft.com/office/powerpoint/2012/main" xmlns:ahyp="http://schemas.microsoft.com/office/drawing/2018/hyperlinkcolor">
-  <p:cSld>
-    <p:spTree>
-      <p:nvGrpSpPr>
-        <p:cNvPr id="110" name="Shape 110"/>
-        <p:cNvGrpSpPr/>
-        <p:nvPr/>
-      </p:nvGrpSpPr>
-      <p:grpSpPr>
-        <a:xfrm>
-          <a:off x="0" y="0"/>
-          <a:ext cx="0" cy="0"/>
-          <a:chOff x="0" y="0"/>
-          <a:chExt cx="0" cy="0"/>
-        </a:xfrm>
-      </p:grpSpPr>
-      <p:sp>
-        <p:nvSpPr>
-          <p:cNvPr id="111" name="Google Shape;111;p21"/>
-          <p:cNvSpPr txBox="1"/>
-          <p:nvPr>
-            <p:ph type="title"/>
-          </p:nvPr>
-        </p:nvSpPr>
-        <p:spPr>
-          <a:xfrm>
-            <a:off x="311700" y="445025"/>
-            <a:ext cx="8520600" cy="572700"/>
-          </a:xfrm>
-          <a:prstGeom prst="rect">
-            <a:avLst/>
-          </a:prstGeom>
-        </p:spPr>
-        <p:txBody>
-          <a:bodyPr anchorCtr="0" anchor="t" bIns="91425" lIns="91425" spcFirstLastPara="1" rIns="91425" wrap="square" tIns="91425">
-            <a:normAutofit fontScale="90000"/>
-          </a:bodyPr>
-          <a:lstStyle/>
-          <a:p>
-            <a:pPr indent="0" lvl="0" marL="0" rtl="0" algn="l">
-              <a:spcBef>
-                <a:spcPts val="0"/>
-              </a:spcBef>
-              <a:spcAft>
-                <a:spcPts val="0"/>
-              </a:spcAft>
-              <a:buNone/>
-            </a:pPr>
-            <a:r>
-              <a:rPr lang="en"/>
-              <a:t>Lastly…. This week!</a:t>
-            </a:r>
-            <a:endParaRPr/>
-          </a:p>
-        </p:txBody>
-      </p:sp>
-      <p:sp>
-        <p:nvSpPr>
-          <p:cNvPr id="112" name="Google Shape;112;p21"/>
-          <p:cNvSpPr txBox="1"/>
-          <p:nvPr>
-            <p:ph idx="1" type="body"/>
-          </p:nvPr>
-        </p:nvSpPr>
-        <p:spPr>
-          <a:xfrm>
-            <a:off x="311700" y="1152475"/>
-            <a:ext cx="8520600" cy="3416400"/>
-          </a:xfrm>
-          <a:prstGeom prst="rect">
-            <a:avLst/>
-          </a:prstGeom>
-        </p:spPr>
-        <p:txBody>
-          <a:bodyPr anchorCtr="0" anchor="t" bIns="91425" lIns="91425" spcFirstLastPara="1" rIns="91425" wrap="square" tIns="91425">
-            <a:normAutofit/>
-          </a:bodyPr>
-          <a:lstStyle/>
-          <a:p>
-            <a:pPr indent="0" lvl="0" marL="0" rtl="0" algn="l">
-              <a:spcBef>
-                <a:spcPts val="0"/>
-              </a:spcBef>
-              <a:spcAft>
-                <a:spcPts val="0"/>
-              </a:spcAft>
-              <a:buNone/>
-            </a:pPr>
-            <a:r>
-              <a:rPr lang="en" sz="2200"/>
-              <a:t>Testing!</a:t>
-            </a:r>
-            <a:endParaRPr sz="2200"/>
-          </a:p>
-          <a:p>
-            <a:pPr indent="-355600" lvl="0" marL="457200" rtl="0" algn="l">
-              <a:spcBef>
-                <a:spcPts val="1200"/>
-              </a:spcBef>
-              <a:spcAft>
-                <a:spcPts val="0"/>
-              </a:spcAft>
-              <a:buSzPts val="2000"/>
-              <a:buChar char="●"/>
-            </a:pPr>
-            <a:r>
-              <a:rPr lang="en" sz="2000"/>
-              <a:t>Homework 4</a:t>
-            </a:r>
-            <a:endParaRPr sz="2000"/>
-          </a:p>
-          <a:p>
-            <a:pPr indent="-355600" lvl="0" marL="457200" rtl="0" algn="l">
-              <a:spcBef>
-                <a:spcPts val="0"/>
-              </a:spcBef>
-              <a:spcAft>
-                <a:spcPts val="0"/>
-              </a:spcAft>
-              <a:buSzPts val="2000"/>
-              <a:buChar char="●"/>
-            </a:pPr>
-            <a:r>
-              <a:rPr lang="en" sz="2000"/>
-              <a:t>Testing expected for your project</a:t>
-            </a:r>
-            <a:endParaRPr sz="2000"/>
           </a:p>
         </p:txBody>
       </p:sp>

</xml_diff>